<commit_message>
Sample added and CAD edit
</commit_message>
<xml_diff>
--- a/System_development/magnet_design/design_considerations/magnet_design.pptx
+++ b/System_development/magnet_design/design_considerations/magnet_design.pptx
@@ -235,7 +235,7 @@
           <a:p>
             <a:fld id="{7D038C9C-4B69-864E-9EEE-DFA43CC144D2}" type="datetimeFigureOut">
               <a:rPr lang="en-US" smtClean="0"/>
-              <a:t>9/25/2025</a:t>
+              <a:t>10/17/2025</a:t>
             </a:fld>
             <a:endParaRPr lang="en-US"/>
           </a:p>
@@ -412,7 +412,7 @@
           <a:p>
             <a:fld id="{41D9A61E-B1D6-C34D-A321-B3E90F6DE630}" type="datetimeFigureOut">
               <a:rPr lang="en-US" smtClean="0"/>
-              <a:t>9/25/2025</a:t>
+              <a:t>10/17/2025</a:t>
             </a:fld>
             <a:endParaRPr lang="en-US"/>
           </a:p>
@@ -3655,31 +3655,6 @@
           </a:p>
         </p:txBody>
       </p:sp>
-      <p:sp>
-        <p:nvSpPr>
-          <p:cNvPr id="6" name="Subtitle 5">
-            <a:extLst>
-              <a:ext uri="{FF2B5EF4-FFF2-40B4-BE49-F238E27FC236}">
-                <a16:creationId xmlns:a16="http://schemas.microsoft.com/office/drawing/2014/main" id="{8DB81217-8B12-0755-C0D5-2A338620CB04}"/>
-              </a:ext>
-            </a:extLst>
-          </p:cNvPr>
-          <p:cNvSpPr>
-            <a:spLocks noGrp="1"/>
-          </p:cNvSpPr>
-          <p:nvPr>
-            <p:ph type="subTitle" idx="1"/>
-          </p:nvPr>
-        </p:nvSpPr>
-        <p:spPr/>
-        <p:txBody>
-          <a:bodyPr/>
-          <a:lstStyle/>
-          <a:p>
-            <a:endParaRPr lang="en-US"/>
-          </a:p>
-        </p:txBody>
-      </p:sp>
     </p:spTree>
     <p:extLst>
       <p:ext uri="{BB962C8B-B14F-4D97-AF65-F5344CB8AC3E}">
@@ -4181,7 +4156,7 @@
           <a:p>
             <a:r>
               <a:rPr lang="en-US" dirty="0"/>
-              <a:t>Why Develop a Modular, Sensor-Rich Battery System?</a:t>
+              <a:t>Why Develop a Homogenous Magnetic Field?</a:t>
             </a:r>
           </a:p>
         </p:txBody>
@@ -4210,104 +4185,25 @@
         </p:spPr>
         <p:txBody>
           <a:bodyPr>
-            <a:normAutofit fontScale="70000" lnSpcReduction="20000"/>
+            <a:normAutofit/>
           </a:bodyPr>
           <a:lstStyle/>
           <a:p>
             <a:r>
-              <a:rPr lang="en-US" dirty="0"/>
-              <a:t>Supports Next-Generation Energy Storage</a:t>
-            </a:r>
-          </a:p>
-          <a:p>
-            <a:pPr lvl="1"/>
-            <a:r>
-              <a:rPr lang="en-US" dirty="0"/>
-              <a:t>Enables research on distributed energy systems and high-performance battery management</a:t>
-            </a:r>
-          </a:p>
-          <a:p>
-            <a:pPr lvl="1"/>
-            <a:r>
-              <a:rPr lang="en-US" dirty="0"/>
-              <a:t>Facilitates scalability for a wide range of power applications</a:t>
-            </a:r>
-          </a:p>
-          <a:p>
-            <a:r>
-              <a:rPr lang="en-US" dirty="0"/>
-              <a:t>Enhances Digital Twin Development</a:t>
-            </a:r>
-          </a:p>
-          <a:p>
-            <a:pPr lvl="1"/>
-            <a:r>
-              <a:rPr lang="en-US" dirty="0"/>
-              <a:t>Real-time, high-fidelity data streams enable dynamic model validation and predictive analytics</a:t>
-            </a:r>
-          </a:p>
-          <a:p>
-            <a:pPr lvl="1"/>
-            <a:r>
-              <a:rPr lang="en-US" dirty="0"/>
-              <a:t>Integrated sensors allow continuous updates to electrochemical, thermal, and mechanical models</a:t>
-            </a:r>
-          </a:p>
-          <a:p>
-            <a:r>
-              <a:rPr lang="en-US" dirty="0"/>
-              <a:t>Enables Flexible and Configurable Testing</a:t>
-            </a:r>
-          </a:p>
-          <a:p>
-            <a:pPr lvl="1"/>
-            <a:r>
-              <a:rPr lang="en-US" dirty="0"/>
-              <a:t>Modular 42V (10S1P) design allows for series/parallel stacking to replicate different battery pack architectures</a:t>
-            </a:r>
-          </a:p>
-          <a:p>
-            <a:pPr lvl="1"/>
-            <a:r>
-              <a:rPr lang="en-US" dirty="0"/>
-              <a:t>Supports multiple cell sizes and chemistries (e.g., 18650, 21700, NMC, LFP) for diverse application </a:t>
-            </a:r>
-            <a:r>
-              <a:rPr lang="en-US" dirty="0" err="1"/>
-              <a:t>studiesImproves</a:t>
+              <a:rPr lang="en-US" b="1" dirty="0"/>
+              <a:t>Higher homogeneity → sharper signals but reduced bandwidth and robustness</a:t>
             </a:r>
             <a:r>
               <a:rPr lang="en-US" dirty="0"/>
-              <a:t> </a:t>
-            </a:r>
-          </a:p>
-          <a:p>
-            <a:r>
-              <a:rPr lang="en-US" dirty="0"/>
-              <a:t>Advanced Battery Control and Monitoring</a:t>
-            </a:r>
-          </a:p>
-          <a:p>
-            <a:pPr lvl="1"/>
-            <a:r>
-              <a:rPr lang="en-US" dirty="0"/>
-              <a:t>High-resolution BMS with </a:t>
+              <a:t> in </a:t>
             </a:r>
             <a:r>
-              <a:rPr lang="en-US" dirty="0" err="1"/>
-              <a:t>CompactDAQ</a:t>
+              <a:rPr lang="en-US"/>
+              <a:t>field conditions</a:t>
             </a:r>
-            <a:r>
-              <a:rPr lang="en-US" dirty="0"/>
-              <a:t> integration enables real-time state estimation and anomaly detection</a:t>
-            </a:r>
-          </a:p>
-          <a:p>
-            <a:pPr lvl="1"/>
-            <a:r>
-              <a:rPr lang="en-US" dirty="0"/>
-              <a:t>Adaptive energy management through advanced control strategies</a:t>
-            </a:r>
+          </a:p>
+          <a:p>
+            <a:endParaRPr lang="en-US" dirty="0"/>
           </a:p>
         </p:txBody>
       </p:sp>
@@ -4391,10 +4287,7 @@
           <a:bodyPr/>
           <a:lstStyle/>
           <a:p>
-            <a:r>
-              <a:rPr lang="en-US" dirty="0"/>
-              <a:t>…</a:t>
-            </a:r>
+            <a:endParaRPr lang="en-US" dirty="0"/>
           </a:p>
         </p:txBody>
       </p:sp>
@@ -4426,10 +4319,7 @@
           </a:bodyPr>
           <a:lstStyle/>
           <a:p>
-            <a:r>
-              <a:rPr lang="en-US" dirty="0"/>
-              <a:t>…</a:t>
-            </a:r>
+            <a:endParaRPr lang="en-US" dirty="0"/>
           </a:p>
         </p:txBody>
       </p:sp>

</xml_diff>